<commit_message>
Informe 1 - Figuras de los circuitos editadas
</commit_message>
<xml_diff>
--- a/Circuitos-informe1.pptx
+++ b/Circuitos-informe1.pptx
@@ -288,7 +288,7 @@
           <a:p>
             <a:fld id="{A9CE8D18-5E45-467F-AA13-A08EC1C1E105}" type="datetimeFigureOut">
               <a:rPr lang="es-AR" smtClean="0"/>
-              <a:t>03/02/2016</a:t>
+              <a:t>04/02/2016</a:t>
             </a:fld>
             <a:endParaRPr lang="es-AR"/>
           </a:p>
@@ -458,7 +458,7 @@
           <a:p>
             <a:fld id="{A9CE8D18-5E45-467F-AA13-A08EC1C1E105}" type="datetimeFigureOut">
               <a:rPr lang="es-AR" smtClean="0"/>
-              <a:t>03/02/2016</a:t>
+              <a:t>04/02/2016</a:t>
             </a:fld>
             <a:endParaRPr lang="es-AR"/>
           </a:p>
@@ -638,7 +638,7 @@
           <a:p>
             <a:fld id="{A9CE8D18-5E45-467F-AA13-A08EC1C1E105}" type="datetimeFigureOut">
               <a:rPr lang="es-AR" smtClean="0"/>
-              <a:t>03/02/2016</a:t>
+              <a:t>04/02/2016</a:t>
             </a:fld>
             <a:endParaRPr lang="es-AR"/>
           </a:p>
@@ -808,7 +808,7 @@
           <a:p>
             <a:fld id="{A9CE8D18-5E45-467F-AA13-A08EC1C1E105}" type="datetimeFigureOut">
               <a:rPr lang="es-AR" smtClean="0"/>
-              <a:t>03/02/2016</a:t>
+              <a:t>04/02/2016</a:t>
             </a:fld>
             <a:endParaRPr lang="es-AR"/>
           </a:p>
@@ -1054,7 +1054,7 @@
           <a:p>
             <a:fld id="{A9CE8D18-5E45-467F-AA13-A08EC1C1E105}" type="datetimeFigureOut">
               <a:rPr lang="es-AR" smtClean="0"/>
-              <a:t>03/02/2016</a:t>
+              <a:t>04/02/2016</a:t>
             </a:fld>
             <a:endParaRPr lang="es-AR"/>
           </a:p>
@@ -1342,7 +1342,7 @@
           <a:p>
             <a:fld id="{A9CE8D18-5E45-467F-AA13-A08EC1C1E105}" type="datetimeFigureOut">
               <a:rPr lang="es-AR" smtClean="0"/>
-              <a:t>03/02/2016</a:t>
+              <a:t>04/02/2016</a:t>
             </a:fld>
             <a:endParaRPr lang="es-AR"/>
           </a:p>
@@ -1764,7 +1764,7 @@
           <a:p>
             <a:fld id="{A9CE8D18-5E45-467F-AA13-A08EC1C1E105}" type="datetimeFigureOut">
               <a:rPr lang="es-AR" smtClean="0"/>
-              <a:t>03/02/2016</a:t>
+              <a:t>04/02/2016</a:t>
             </a:fld>
             <a:endParaRPr lang="es-AR"/>
           </a:p>
@@ -1882,7 +1882,7 @@
           <a:p>
             <a:fld id="{A9CE8D18-5E45-467F-AA13-A08EC1C1E105}" type="datetimeFigureOut">
               <a:rPr lang="es-AR" smtClean="0"/>
-              <a:t>03/02/2016</a:t>
+              <a:t>04/02/2016</a:t>
             </a:fld>
             <a:endParaRPr lang="es-AR"/>
           </a:p>
@@ -1977,7 +1977,7 @@
           <a:p>
             <a:fld id="{A9CE8D18-5E45-467F-AA13-A08EC1C1E105}" type="datetimeFigureOut">
               <a:rPr lang="es-AR" smtClean="0"/>
-              <a:t>03/02/2016</a:t>
+              <a:t>04/02/2016</a:t>
             </a:fld>
             <a:endParaRPr lang="es-AR"/>
           </a:p>
@@ -2254,7 +2254,7 @@
           <a:p>
             <a:fld id="{A9CE8D18-5E45-467F-AA13-A08EC1C1E105}" type="datetimeFigureOut">
               <a:rPr lang="es-AR" smtClean="0"/>
-              <a:t>03/02/2016</a:t>
+              <a:t>04/02/2016</a:t>
             </a:fld>
             <a:endParaRPr lang="es-AR"/>
           </a:p>
@@ -2507,7 +2507,7 @@
           <a:p>
             <a:fld id="{A9CE8D18-5E45-467F-AA13-A08EC1C1E105}" type="datetimeFigureOut">
               <a:rPr lang="es-AR" smtClean="0"/>
-              <a:t>03/02/2016</a:t>
+              <a:t>04/02/2016</a:t>
             </a:fld>
             <a:endParaRPr lang="es-AR"/>
           </a:p>
@@ -2720,7 +2720,7 @@
           <a:p>
             <a:fld id="{A9CE8D18-5E45-467F-AA13-A08EC1C1E105}" type="datetimeFigureOut">
               <a:rPr lang="es-AR" smtClean="0"/>
-              <a:t>03/02/2016</a:t>
+              <a:t>04/02/2016</a:t>
             </a:fld>
             <a:endParaRPr lang="es-AR"/>
           </a:p>
@@ -3418,7 +3418,7 @@
         </p:nvGrpSpPr>
         <p:grpSpPr>
           <a:xfrm>
-            <a:off x="1372984" y="2753414"/>
+            <a:off x="1250863" y="2753414"/>
             <a:ext cx="358465" cy="163204"/>
             <a:chOff x="2659249" y="1603127"/>
             <a:chExt cx="864393" cy="736253"/>
@@ -3677,9 +3677,9 @@
           <p:nvPr/>
         </p:nvCxnSpPr>
         <p:spPr>
-          <a:xfrm flipV="1">
-            <a:off x="1126503" y="2829570"/>
-            <a:ext cx="232068" cy="1795"/>
+          <a:xfrm>
+            <a:off x="1126503" y="2831366"/>
+            <a:ext cx="116034" cy="1857"/>
           </a:xfrm>
           <a:prstGeom prst="line">
             <a:avLst/>
@@ -3713,8 +3713,8 @@
         </p:nvCxnSpPr>
         <p:spPr>
           <a:xfrm flipV="1">
-            <a:off x="1726464" y="2834987"/>
-            <a:ext cx="136163" cy="1"/>
+            <a:off x="1609328" y="2834988"/>
+            <a:ext cx="253299" cy="1821"/>
           </a:xfrm>
           <a:prstGeom prst="line">
             <a:avLst/>
@@ -3784,7 +3784,7 @@
         <p:spPr>
           <a:xfrm>
             <a:off x="1944741" y="3065827"/>
-            <a:ext cx="0" cy="145809"/>
+            <a:ext cx="0" cy="72904"/>
           </a:xfrm>
           <a:prstGeom prst="line">
             <a:avLst/>
@@ -3818,7 +3818,7 @@
         </p:nvGrpSpPr>
         <p:grpSpPr>
           <a:xfrm rot="5400000">
-            <a:off x="1771015" y="3305228"/>
+            <a:off x="1771015" y="3233574"/>
             <a:ext cx="358465" cy="163204"/>
             <a:chOff x="2659249" y="1603127"/>
             <a:chExt cx="864393" cy="736253"/>
@@ -4070,266 +4070,6 @@
           </p:style>
         </p:cxnSp>
       </p:grpSp>
-      <p:grpSp>
-        <p:nvGrpSpPr>
-          <p:cNvPr id="228" name="Group 227"/>
-          <p:cNvGrpSpPr/>
-          <p:nvPr/>
-        </p:nvGrpSpPr>
-        <p:grpSpPr>
-          <a:xfrm rot="5400000">
-            <a:off x="2191715" y="3304893"/>
-            <a:ext cx="358465" cy="163204"/>
-            <a:chOff x="2659249" y="1603127"/>
-            <a:chExt cx="864393" cy="736253"/>
-          </a:xfrm>
-        </p:grpSpPr>
-        <p:cxnSp>
-          <p:nvCxnSpPr>
-            <p:cNvPr id="229" name="Straight Connector 228"/>
-            <p:cNvCxnSpPr/>
-            <p:nvPr/>
-          </p:nvCxnSpPr>
-          <p:spPr>
-            <a:xfrm>
-              <a:off x="2659249" y="1979340"/>
-              <a:ext cx="72008" cy="360040"/>
-            </a:xfrm>
-            <a:prstGeom prst="line">
-              <a:avLst/>
-            </a:prstGeom>
-            <a:ln w="9525">
-              <a:solidFill>
-                <a:schemeClr val="tx1"/>
-              </a:solidFill>
-            </a:ln>
-          </p:spPr>
-          <p:style>
-            <a:lnRef idx="1">
-              <a:schemeClr val="accent1"/>
-            </a:lnRef>
-            <a:fillRef idx="0">
-              <a:schemeClr val="accent1"/>
-            </a:fillRef>
-            <a:effectRef idx="0">
-              <a:schemeClr val="accent1"/>
-            </a:effectRef>
-            <a:fontRef idx="minor">
-              <a:schemeClr val="tx1"/>
-            </a:fontRef>
-          </p:style>
-        </p:cxnSp>
-        <p:cxnSp>
-          <p:nvCxnSpPr>
-            <p:cNvPr id="230" name="Straight Connector 229"/>
-            <p:cNvCxnSpPr/>
-            <p:nvPr/>
-          </p:nvCxnSpPr>
-          <p:spPr>
-            <a:xfrm flipV="1">
-              <a:off x="2731554" y="1619300"/>
-              <a:ext cx="144016" cy="720080"/>
-            </a:xfrm>
-            <a:prstGeom prst="line">
-              <a:avLst/>
-            </a:prstGeom>
-            <a:ln w="9525">
-              <a:solidFill>
-                <a:schemeClr val="tx1"/>
-              </a:solidFill>
-            </a:ln>
-          </p:spPr>
-          <p:style>
-            <a:lnRef idx="1">
-              <a:schemeClr val="accent1"/>
-            </a:lnRef>
-            <a:fillRef idx="0">
-              <a:schemeClr val="accent1"/>
-            </a:fillRef>
-            <a:effectRef idx="0">
-              <a:schemeClr val="accent1"/>
-            </a:effectRef>
-            <a:fontRef idx="minor">
-              <a:schemeClr val="tx1"/>
-            </a:fontRef>
-          </p:style>
-        </p:cxnSp>
-        <p:cxnSp>
-          <p:nvCxnSpPr>
-            <p:cNvPr id="231" name="Straight Connector 230"/>
-            <p:cNvCxnSpPr/>
-            <p:nvPr/>
-          </p:nvCxnSpPr>
-          <p:spPr>
-            <a:xfrm flipV="1">
-              <a:off x="3019586" y="1619300"/>
-              <a:ext cx="144016" cy="720080"/>
-            </a:xfrm>
-            <a:prstGeom prst="line">
-              <a:avLst/>
-            </a:prstGeom>
-            <a:ln w="9525">
-              <a:solidFill>
-                <a:schemeClr val="tx1"/>
-              </a:solidFill>
-            </a:ln>
-          </p:spPr>
-          <p:style>
-            <a:lnRef idx="1">
-              <a:schemeClr val="accent1"/>
-            </a:lnRef>
-            <a:fillRef idx="0">
-              <a:schemeClr val="accent1"/>
-            </a:fillRef>
-            <a:effectRef idx="0">
-              <a:schemeClr val="accent1"/>
-            </a:effectRef>
-            <a:fontRef idx="minor">
-              <a:schemeClr val="tx1"/>
-            </a:fontRef>
-          </p:style>
-        </p:cxnSp>
-        <p:cxnSp>
-          <p:nvCxnSpPr>
-            <p:cNvPr id="232" name="Straight Connector 231"/>
-            <p:cNvCxnSpPr/>
-            <p:nvPr/>
-          </p:nvCxnSpPr>
-          <p:spPr>
-            <a:xfrm>
-              <a:off x="2875570" y="1619300"/>
-              <a:ext cx="144016" cy="720080"/>
-            </a:xfrm>
-            <a:prstGeom prst="line">
-              <a:avLst/>
-            </a:prstGeom>
-            <a:ln w="9525">
-              <a:solidFill>
-                <a:schemeClr val="tx1"/>
-              </a:solidFill>
-            </a:ln>
-          </p:spPr>
-          <p:style>
-            <a:lnRef idx="1">
-              <a:schemeClr val="accent1"/>
-            </a:lnRef>
-            <a:fillRef idx="0">
-              <a:schemeClr val="accent1"/>
-            </a:fillRef>
-            <a:effectRef idx="0">
-              <a:schemeClr val="accent1"/>
-            </a:effectRef>
-            <a:fontRef idx="minor">
-              <a:schemeClr val="tx1"/>
-            </a:fontRef>
-          </p:style>
-        </p:cxnSp>
-        <p:cxnSp>
-          <p:nvCxnSpPr>
-            <p:cNvPr id="233" name="Straight Connector 232"/>
-            <p:cNvCxnSpPr/>
-            <p:nvPr/>
-          </p:nvCxnSpPr>
-          <p:spPr>
-            <a:xfrm flipV="1">
-              <a:off x="3307618" y="1619300"/>
-              <a:ext cx="144016" cy="720080"/>
-            </a:xfrm>
-            <a:prstGeom prst="line">
-              <a:avLst/>
-            </a:prstGeom>
-            <a:ln w="9525">
-              <a:solidFill>
-                <a:schemeClr val="tx1"/>
-              </a:solidFill>
-            </a:ln>
-          </p:spPr>
-          <p:style>
-            <a:lnRef idx="1">
-              <a:schemeClr val="accent1"/>
-            </a:lnRef>
-            <a:fillRef idx="0">
-              <a:schemeClr val="accent1"/>
-            </a:fillRef>
-            <a:effectRef idx="0">
-              <a:schemeClr val="accent1"/>
-            </a:effectRef>
-            <a:fontRef idx="minor">
-              <a:schemeClr val="tx1"/>
-            </a:fontRef>
-          </p:style>
-        </p:cxnSp>
-        <p:cxnSp>
-          <p:nvCxnSpPr>
-            <p:cNvPr id="234" name="Straight Connector 233"/>
-            <p:cNvCxnSpPr/>
-            <p:nvPr/>
-          </p:nvCxnSpPr>
-          <p:spPr>
-            <a:xfrm>
-              <a:off x="3163602" y="1619300"/>
-              <a:ext cx="144016" cy="720080"/>
-            </a:xfrm>
-            <a:prstGeom prst="line">
-              <a:avLst/>
-            </a:prstGeom>
-            <a:ln w="9525">
-              <a:solidFill>
-                <a:schemeClr val="tx1"/>
-              </a:solidFill>
-            </a:ln>
-          </p:spPr>
-          <p:style>
-            <a:lnRef idx="1">
-              <a:schemeClr val="accent1"/>
-            </a:lnRef>
-            <a:fillRef idx="0">
-              <a:schemeClr val="accent1"/>
-            </a:fillRef>
-            <a:effectRef idx="0">
-              <a:schemeClr val="accent1"/>
-            </a:effectRef>
-            <a:fontRef idx="minor">
-              <a:schemeClr val="tx1"/>
-            </a:fontRef>
-          </p:style>
-        </p:cxnSp>
-        <p:cxnSp>
-          <p:nvCxnSpPr>
-            <p:cNvPr id="235" name="Straight Connector 234"/>
-            <p:cNvCxnSpPr/>
-            <p:nvPr/>
-          </p:nvCxnSpPr>
-          <p:spPr>
-            <a:xfrm>
-              <a:off x="3451634" y="1603127"/>
-              <a:ext cx="72008" cy="360040"/>
-            </a:xfrm>
-            <a:prstGeom prst="line">
-              <a:avLst/>
-            </a:prstGeom>
-            <a:ln w="9525">
-              <a:solidFill>
-                <a:schemeClr val="tx1"/>
-              </a:solidFill>
-            </a:ln>
-          </p:spPr>
-          <p:style>
-            <a:lnRef idx="1">
-              <a:schemeClr val="accent1"/>
-            </a:lnRef>
-            <a:fillRef idx="0">
-              <a:schemeClr val="accent1"/>
-            </a:fillRef>
-            <a:effectRef idx="0">
-              <a:schemeClr val="accent1"/>
-            </a:effectRef>
-            <a:fontRef idx="minor">
-              <a:schemeClr val="tx1"/>
-            </a:fontRef>
-          </p:style>
-        </p:cxnSp>
-      </p:grpSp>
       <p:cxnSp>
         <p:nvCxnSpPr>
           <p:cNvPr id="236" name="Straight Connector 235"/>
@@ -4374,7 +4114,7 @@
         <p:spPr>
           <a:xfrm flipV="1">
             <a:off x="1133597" y="3261771"/>
-            <a:ext cx="0" cy="803294"/>
+            <a:ext cx="0" cy="878987"/>
           </a:xfrm>
           <a:prstGeom prst="line">
             <a:avLst/>
@@ -4408,43 +4148,8 @@
         </p:nvCxnSpPr>
         <p:spPr>
           <a:xfrm>
-            <a:off x="1128644" y="4065065"/>
-            <a:ext cx="1032302" cy="0"/>
-          </a:xfrm>
-          <a:prstGeom prst="line">
-            <a:avLst/>
-          </a:prstGeom>
-          <a:ln w="6350">
-            <a:solidFill>
-              <a:schemeClr val="tx1"/>
-            </a:solidFill>
-          </a:ln>
-        </p:spPr>
-        <p:style>
-          <a:lnRef idx="1">
-            <a:schemeClr val="accent1"/>
-          </a:lnRef>
-          <a:fillRef idx="0">
-            <a:schemeClr val="accent1"/>
-          </a:fillRef>
-          <a:effectRef idx="0">
-            <a:schemeClr val="accent1"/>
-          </a:effectRef>
-          <a:fontRef idx="minor">
-            <a:schemeClr val="tx1"/>
-          </a:fontRef>
-        </p:style>
-      </p:cxnSp>
-      <p:cxnSp>
-        <p:nvCxnSpPr>
-          <p:cNvPr id="239" name="Straight Connector 238"/>
-          <p:cNvCxnSpPr/>
-          <p:nvPr/>
-        </p:nvCxnSpPr>
-        <p:spPr>
-          <a:xfrm>
-            <a:off x="2370948" y="3065827"/>
-            <a:ext cx="0" cy="145809"/>
+            <a:off x="1139684" y="4140758"/>
+            <a:ext cx="1019121" cy="0"/>
           </a:xfrm>
           <a:prstGeom prst="line">
             <a:avLst/>
@@ -4477,9 +4182,9 @@
           <p:nvPr/>
         </p:nvCxnSpPr>
         <p:spPr>
-          <a:xfrm flipH="1">
-            <a:off x="1952040" y="3566063"/>
-            <a:ext cx="1" cy="63967"/>
+          <a:xfrm>
+            <a:off x="1950891" y="3494409"/>
+            <a:ext cx="0" cy="242716"/>
           </a:xfrm>
           <a:prstGeom prst="line">
             <a:avLst/>
@@ -4512,9 +4217,9 @@
           <p:nvPr/>
         </p:nvCxnSpPr>
         <p:spPr>
-          <a:xfrm flipV="1">
-            <a:off x="1952040" y="3853028"/>
-            <a:ext cx="424285" cy="3473"/>
+          <a:xfrm>
+            <a:off x="1950302" y="3976193"/>
+            <a:ext cx="426413" cy="0"/>
           </a:xfrm>
           <a:prstGeom prst="line">
             <a:avLst/>
@@ -4548,8 +4253,8 @@
         </p:nvCxnSpPr>
         <p:spPr>
           <a:xfrm flipV="1">
-            <a:off x="2158805" y="3861238"/>
-            <a:ext cx="0" cy="203827"/>
+            <a:off x="2158805" y="3976193"/>
+            <a:ext cx="0" cy="164565"/>
           </a:xfrm>
           <a:prstGeom prst="line">
             <a:avLst/>
@@ -4982,8 +4687,8 @@
           </a:fontRef>
         </p:style>
       </p:cxnSp>
-      <mc:AlternateContent xmlns:mc="http://schemas.openxmlformats.org/markup-compatibility/2006">
-        <mc:Choice xmlns:a14="http://schemas.microsoft.com/office/drawing/2010/main" Requires="a14">
+      <mc:AlternateContent xmlns:mc="http://schemas.openxmlformats.org/markup-compatibility/2006" xmlns:a14="http://schemas.microsoft.com/office/drawing/2010/main">
+        <mc:Choice Requires="a14">
           <p:sp>
             <p:nvSpPr>
               <p:cNvPr id="259" name="TextBox 258"/>
@@ -5006,6 +4711,7 @@
               </a:bodyPr>
               <a:lstStyle/>
               <a:p>
+                <a:pPr/>
                 <a14:m>
                   <m:oMathPara xmlns:m="http://schemas.openxmlformats.org/officeDocument/2006/math">
                     <m:oMathParaPr>
@@ -5027,7 +4733,7 @@
             </p:txBody>
           </p:sp>
         </mc:Choice>
-        <mc:Fallback>
+        <mc:Fallback xmlns="">
           <p:sp>
             <p:nvSpPr>
               <p:cNvPr id="259" name="TextBox 258"/>
@@ -5076,7 +4782,7 @@
             </p:nvSpPr>
             <p:spPr>
               <a:xfrm>
-                <a:off x="1414457" y="2513050"/>
+                <a:off x="1278495" y="2531708"/>
                 <a:ext cx="287130" cy="261610"/>
               </a:xfrm>
               <a:prstGeom prst="rect">
@@ -5090,6 +4796,7 @@
               </a:bodyPr>
               <a:lstStyle/>
               <a:p>
+                <a:pPr/>
                 <a14:m>
                   <m:oMathPara xmlns:m="http://schemas.openxmlformats.org/officeDocument/2006/math">
                     <m:oMathParaPr>
@@ -5122,7 +4829,7 @@
             </p:nvSpPr>
             <p:spPr>
               <a:xfrm>
-                <a:off x="1414457" y="2513050"/>
+                <a:off x="1278495" y="2531708"/>
                 <a:ext cx="287130" cy="261610"/>
               </a:xfrm>
               <a:prstGeom prst="rect">
@@ -5160,7 +4867,7 @@
             </p:nvSpPr>
             <p:spPr>
               <a:xfrm>
-                <a:off x="1576150" y="3274255"/>
+                <a:off x="1636065" y="3154451"/>
                 <a:ext cx="310598" cy="261610"/>
               </a:xfrm>
               <a:prstGeom prst="rect">
@@ -5174,6 +4881,7 @@
               </a:bodyPr>
               <a:lstStyle/>
               <a:p>
+                <a:pPr/>
                 <a14:m>
                   <m:oMathPara xmlns:m="http://schemas.openxmlformats.org/officeDocument/2006/math">
                     <m:oMathParaPr>
@@ -5206,91 +4914,7 @@
             </p:nvSpPr>
             <p:spPr>
               <a:xfrm>
-                <a:off x="1576150" y="3274255"/>
-                <a:ext cx="310598" cy="261610"/>
-              </a:xfrm>
-              <a:prstGeom prst="rect">
-                <a:avLst/>
-              </a:prstGeom>
-              <a:blipFill rotWithShape="1">
-                <a:blip r:embed="rId4"/>
-                <a:stretch>
-                  <a:fillRect/>
-                </a:stretch>
-              </a:blipFill>
-            </p:spPr>
-            <p:txBody>
-              <a:bodyPr/>
-              <a:lstStyle/>
-              <a:p>
-                <a:r>
-                  <a:rPr lang="es-AR">
-                    <a:noFill/>
-                  </a:rPr>
-                  <a:t> </a:t>
-                </a:r>
-              </a:p>
-            </p:txBody>
-          </p:sp>
-        </mc:Fallback>
-      </mc:AlternateContent>
-      <mc:AlternateContent xmlns:mc="http://schemas.openxmlformats.org/markup-compatibility/2006">
-        <mc:Choice xmlns:a14="http://schemas.microsoft.com/office/drawing/2010/main" Requires="a14">
-          <p:sp>
-            <p:nvSpPr>
-              <p:cNvPr id="263" name="TextBox 262"/>
-              <p:cNvSpPr txBox="1"/>
-              <p:nvPr/>
-            </p:nvSpPr>
-            <p:spPr>
-              <a:xfrm>
-                <a:off x="2391404" y="3255751"/>
-                <a:ext cx="310598" cy="261610"/>
-              </a:xfrm>
-              <a:prstGeom prst="rect">
-                <a:avLst/>
-              </a:prstGeom>
-              <a:noFill/>
-            </p:spPr>
-            <p:txBody>
-              <a:bodyPr wrap="none" rtlCol="0">
-                <a:spAutoFit/>
-              </a:bodyPr>
-              <a:lstStyle/>
-              <a:p>
-                <a14:m>
-                  <m:oMathPara xmlns:m="http://schemas.openxmlformats.org/officeDocument/2006/math">
-                    <m:oMathParaPr>
-                      <m:jc m:val="centerGroup"/>
-                    </m:oMathParaPr>
-                    <m:oMath xmlns:m="http://schemas.openxmlformats.org/officeDocument/2006/math">
-                      <m:r>
-                        <a:rPr lang="es-AR" sz="1100" i="1" smtClean="0">
-                          <a:latin typeface="Cambria Math"/>
-                          <a:ea typeface="Cambria Math"/>
-                        </a:rPr>
-                        <m:t>𝑅</m:t>
-                      </m:r>
-                    </m:oMath>
-                  </m:oMathPara>
-                </a14:m>
-                <a:endParaRPr lang="es-AR" sz="1400" dirty="0"/>
-              </a:p>
-            </p:txBody>
-          </p:sp>
-        </mc:Choice>
-        <mc:Fallback>
-          <p:sp>
-            <p:nvSpPr>
-              <p:cNvPr id="263" name="TextBox 262"/>
-              <p:cNvSpPr txBox="1">
-                <a:spLocks noRot="1" noChangeAspect="1" noMove="1" noResize="1" noEditPoints="1" noAdjustHandles="1" noChangeArrowheads="1" noChangeShapeType="1" noTextEdit="1"/>
-              </p:cNvSpPr>
-              <p:nvPr/>
-            </p:nvSpPr>
-            <p:spPr>
-              <a:xfrm>
-                <a:off x="2391404" y="3255751"/>
+                <a:off x="1636065" y="3154451"/>
                 <a:ext cx="310598" cy="261610"/>
               </a:xfrm>
               <a:prstGeom prst="rect">
@@ -6553,8 +6177,8 @@
           </a:fontRef>
         </p:style>
       </p:cxnSp>
-      <mc:AlternateContent xmlns:mc="http://schemas.openxmlformats.org/markup-compatibility/2006">
-        <mc:Choice xmlns:a14="http://schemas.microsoft.com/office/drawing/2010/main" Requires="a14">
+      <mc:AlternateContent xmlns:mc="http://schemas.openxmlformats.org/markup-compatibility/2006" xmlns:a14="http://schemas.microsoft.com/office/drawing/2010/main">
+        <mc:Choice Requires="a14">
           <p:sp>
             <p:nvSpPr>
               <p:cNvPr id="303" name="TextBox 302"/>
@@ -6577,6 +6201,7 @@
               </a:bodyPr>
               <a:lstStyle/>
               <a:p>
+                <a:pPr/>
                 <a14:m>
                   <m:oMathPara xmlns:m="http://schemas.openxmlformats.org/officeDocument/2006/math">
                     <m:oMathParaPr>
@@ -6598,7 +6223,7 @@
             </p:txBody>
           </p:sp>
         </mc:Choice>
-        <mc:Fallback>
+        <mc:Fallback xmlns="">
           <p:sp>
             <p:nvSpPr>
               <p:cNvPr id="303" name="TextBox 302"/>
@@ -6637,8 +6262,8 @@
           </p:sp>
         </mc:Fallback>
       </mc:AlternateContent>
-      <mc:AlternateContent xmlns:mc="http://schemas.openxmlformats.org/markup-compatibility/2006">
-        <mc:Choice xmlns:a14="http://schemas.microsoft.com/office/drawing/2010/main" Requires="a14">
+      <mc:AlternateContent xmlns:mc="http://schemas.openxmlformats.org/markup-compatibility/2006" xmlns:a14="http://schemas.microsoft.com/office/drawing/2010/main">
+        <mc:Choice Requires="a14">
           <p:sp>
             <p:nvSpPr>
               <p:cNvPr id="304" name="TextBox 303"/>
@@ -6661,6 +6286,7 @@
               </a:bodyPr>
               <a:lstStyle/>
               <a:p>
+                <a:pPr/>
                 <a14:m>
                   <m:oMathPara xmlns:m="http://schemas.openxmlformats.org/officeDocument/2006/math">
                     <m:oMathParaPr>
@@ -6682,7 +6308,7 @@
             </p:txBody>
           </p:sp>
         </mc:Choice>
-        <mc:Fallback>
+        <mc:Fallback xmlns="">
           <p:sp>
             <p:nvSpPr>
               <p:cNvPr id="304" name="TextBox 303"/>
@@ -6721,8 +6347,8 @@
           </p:sp>
         </mc:Fallback>
       </mc:AlternateContent>
-      <mc:AlternateContent xmlns:mc="http://schemas.openxmlformats.org/markup-compatibility/2006">
-        <mc:Choice xmlns:a14="http://schemas.microsoft.com/office/drawing/2010/main" Requires="a14">
+      <mc:AlternateContent xmlns:mc="http://schemas.openxmlformats.org/markup-compatibility/2006" xmlns:a14="http://schemas.microsoft.com/office/drawing/2010/main">
+        <mc:Choice Requires="a14">
           <p:sp>
             <p:nvSpPr>
               <p:cNvPr id="305" name="TextBox 304"/>
@@ -6745,6 +6371,7 @@
               </a:bodyPr>
               <a:lstStyle/>
               <a:p>
+                <a:pPr/>
                 <a14:m>
                   <m:oMathPara xmlns:m="http://schemas.openxmlformats.org/officeDocument/2006/math">
                     <m:oMathParaPr>
@@ -6766,7 +6393,7 @@
             </p:txBody>
           </p:sp>
         </mc:Choice>
-        <mc:Fallback>
+        <mc:Fallback xmlns="">
           <p:sp>
             <p:nvSpPr>
               <p:cNvPr id="305" name="TextBox 304"/>
@@ -6784,7 +6411,7 @@
                 <a:avLst/>
               </a:prstGeom>
               <a:blipFill rotWithShape="1">
-                <a:blip r:embed="rId4"/>
+                <a:blip r:embed="rId7"/>
                 <a:stretch>
                   <a:fillRect/>
                 </a:stretch>
@@ -6805,8 +6432,8 @@
           </p:sp>
         </mc:Fallback>
       </mc:AlternateContent>
-      <mc:AlternateContent xmlns:mc="http://schemas.openxmlformats.org/markup-compatibility/2006">
-        <mc:Choice xmlns:a14="http://schemas.microsoft.com/office/drawing/2010/main" Requires="a14">
+      <mc:AlternateContent xmlns:mc="http://schemas.openxmlformats.org/markup-compatibility/2006" xmlns:a14="http://schemas.microsoft.com/office/drawing/2010/main">
+        <mc:Choice Requires="a14">
           <p:sp>
             <p:nvSpPr>
               <p:cNvPr id="306" name="TextBox 305"/>
@@ -6829,6 +6456,7 @@
               </a:bodyPr>
               <a:lstStyle/>
               <a:p>
+                <a:pPr/>
                 <a14:m>
                   <m:oMathPara xmlns:m="http://schemas.openxmlformats.org/officeDocument/2006/math">
                     <m:oMathParaPr>
@@ -6850,7 +6478,7 @@
             </p:txBody>
           </p:sp>
         </mc:Choice>
-        <mc:Fallback>
+        <mc:Fallback xmlns="">
           <p:sp>
             <p:nvSpPr>
               <p:cNvPr id="306" name="TextBox 305"/>
@@ -6868,7 +6496,7 @@
                 <a:avLst/>
               </a:prstGeom>
               <a:blipFill rotWithShape="1">
-                <a:blip r:embed="rId4"/>
+                <a:blip r:embed="rId7"/>
                 <a:stretch>
                   <a:fillRect/>
                 </a:stretch>
@@ -6957,8 +6585,8 @@
           </a:p>
         </p:txBody>
       </p:sp>
-      <mc:AlternateContent xmlns:mc="http://schemas.openxmlformats.org/markup-compatibility/2006">
-        <mc:Choice xmlns:a14="http://schemas.microsoft.com/office/drawing/2010/main" Requires="a14">
+      <mc:AlternateContent xmlns:mc="http://schemas.openxmlformats.org/markup-compatibility/2006" xmlns:a14="http://schemas.microsoft.com/office/drawing/2010/main">
+        <mc:Choice Requires="a14">
           <p:sp>
             <p:nvSpPr>
               <p:cNvPr id="309" name="TextBox 308"/>
@@ -6981,6 +6609,7 @@
               </a:bodyPr>
               <a:lstStyle/>
               <a:p>
+                <a:pPr/>
                 <a14:m>
                   <m:oMathPara xmlns:m="http://schemas.openxmlformats.org/officeDocument/2006/math">
                     <m:oMathParaPr>
@@ -7023,7 +6652,7 @@
             </p:txBody>
           </p:sp>
         </mc:Choice>
-        <mc:Fallback>
+        <mc:Fallback xmlns="">
           <p:sp>
             <p:nvSpPr>
               <p:cNvPr id="309" name="TextBox 308"/>
@@ -7041,7 +6670,7 @@
                 <a:avLst/>
               </a:prstGeom>
               <a:blipFill rotWithShape="1">
-                <a:blip r:embed="rId7"/>
+                <a:blip r:embed="rId8"/>
                 <a:stretch>
                   <a:fillRect/>
                 </a:stretch>
@@ -7194,8 +6823,8 @@
             </a:p>
           </p:txBody>
         </p:sp>
-        <mc:AlternateContent xmlns:mc="http://schemas.openxmlformats.org/markup-compatibility/2006">
-          <mc:Choice xmlns:a14="http://schemas.microsoft.com/office/drawing/2010/main" Requires="a14">
+        <mc:AlternateContent xmlns:mc="http://schemas.openxmlformats.org/markup-compatibility/2006" xmlns:a14="http://schemas.microsoft.com/office/drawing/2010/main">
+          <mc:Choice Requires="a14">
             <p:sp>
               <p:nvSpPr>
                 <p:cNvPr id="321" name="TextBox 320"/>
@@ -7218,6 +6847,7 @@
                 </a:bodyPr>
                 <a:lstStyle/>
                 <a:p>
+                  <a:pPr/>
                   <a14:m>
                     <m:oMathPara xmlns:m="http://schemas.openxmlformats.org/officeDocument/2006/math">
                       <m:oMathParaPr>
@@ -7260,7 +6890,7 @@
               </p:txBody>
             </p:sp>
           </mc:Choice>
-          <mc:Fallback>
+          <mc:Fallback xmlns="">
             <p:sp>
               <p:nvSpPr>
                 <p:cNvPr id="321" name="TextBox 320"/>
@@ -7278,7 +6908,7 @@
                   <a:avLst/>
                 </a:prstGeom>
                 <a:blipFill rotWithShape="1">
-                  <a:blip r:embed="rId8"/>
+                  <a:blip r:embed="rId9"/>
                   <a:stretch>
                     <a:fillRect/>
                   </a:stretch>
@@ -7343,7 +6973,7 @@
         </p:nvGrpSpPr>
         <p:grpSpPr>
           <a:xfrm>
-            <a:off x="1790322" y="3593873"/>
+            <a:off x="1793318" y="3698782"/>
             <a:ext cx="336952" cy="230832"/>
             <a:chOff x="2397460" y="2825291"/>
             <a:chExt cx="350718" cy="238182"/>
@@ -7397,8 +7027,8 @@
             </a:p>
           </p:txBody>
         </p:sp>
-        <mc:AlternateContent xmlns:mc="http://schemas.openxmlformats.org/markup-compatibility/2006">
-          <mc:Choice xmlns:a14="http://schemas.microsoft.com/office/drawing/2010/main" Requires="a14">
+        <mc:AlternateContent xmlns:mc="http://schemas.openxmlformats.org/markup-compatibility/2006" xmlns:a14="http://schemas.microsoft.com/office/drawing/2010/main">
+          <mc:Choice Requires="a14">
             <p:sp>
               <p:nvSpPr>
                 <p:cNvPr id="339" name="TextBox 338"/>
@@ -7421,6 +7051,7 @@
                 </a:bodyPr>
                 <a:lstStyle/>
                 <a:p>
+                  <a:pPr/>
                   <a14:m>
                     <m:oMathPara xmlns:m="http://schemas.openxmlformats.org/officeDocument/2006/math">
                       <m:oMathParaPr>
@@ -7463,248 +7094,10 @@
               </p:txBody>
             </p:sp>
           </mc:Choice>
-          <mc:Fallback>
+          <mc:Fallback xmlns="">
             <p:sp>
               <p:nvSpPr>
                 <p:cNvPr id="339" name="TextBox 338"/>
-                <p:cNvSpPr txBox="1">
-                  <a:spLocks noRot="1" noChangeAspect="1" noMove="1" noResize="1" noEditPoints="1" noAdjustHandles="1" noChangeArrowheads="1" noChangeShapeType="1" noTextEdit="1"/>
-                </p:cNvSpPr>
-                <p:nvPr/>
-              </p:nvSpPr>
-              <p:spPr>
-                <a:xfrm>
-                  <a:off x="2397460" y="2825291"/>
-                  <a:ext cx="350718" cy="238182"/>
-                </a:xfrm>
-                <a:prstGeom prst="rect">
-                  <a:avLst/>
-                </a:prstGeom>
-                <a:blipFill rotWithShape="1">
-                  <a:blip r:embed="rId9"/>
-                  <a:stretch>
-                    <a:fillRect/>
-                  </a:stretch>
-                </a:blipFill>
-              </p:spPr>
-              <p:txBody>
-                <a:bodyPr/>
-                <a:lstStyle/>
-                <a:p>
-                  <a:r>
-                    <a:rPr lang="es-AR">
-                      <a:noFill/>
-                    </a:rPr>
-                    <a:t> </a:t>
-                  </a:r>
-                </a:p>
-              </p:txBody>
-            </p:sp>
-          </mc:Fallback>
-        </mc:AlternateContent>
-      </p:grpSp>
-      <p:cxnSp>
-        <p:nvCxnSpPr>
-          <p:cNvPr id="348" name="Straight Connector 347"/>
-          <p:cNvCxnSpPr/>
-          <p:nvPr/>
-        </p:nvCxnSpPr>
-        <p:spPr>
-          <a:xfrm flipH="1">
-            <a:off x="1952040" y="3799086"/>
-            <a:ext cx="1" cy="63967"/>
-          </a:xfrm>
-          <a:prstGeom prst="line">
-            <a:avLst/>
-          </a:prstGeom>
-          <a:ln w="6350">
-            <a:solidFill>
-              <a:schemeClr val="tx1"/>
-            </a:solidFill>
-          </a:ln>
-        </p:spPr>
-        <p:style>
-          <a:lnRef idx="1">
-            <a:schemeClr val="accent1"/>
-          </a:lnRef>
-          <a:fillRef idx="0">
-            <a:schemeClr val="accent1"/>
-          </a:fillRef>
-          <a:effectRef idx="0">
-            <a:schemeClr val="accent1"/>
-          </a:effectRef>
-          <a:fontRef idx="minor">
-            <a:schemeClr val="tx1"/>
-          </a:fontRef>
-        </p:style>
-      </p:cxnSp>
-      <p:cxnSp>
-        <p:nvCxnSpPr>
-          <p:cNvPr id="350" name="Straight Connector 349"/>
-          <p:cNvCxnSpPr/>
-          <p:nvPr/>
-        </p:nvCxnSpPr>
-        <p:spPr>
-          <a:xfrm flipH="1">
-            <a:off x="2371469" y="3567917"/>
-            <a:ext cx="1" cy="63967"/>
-          </a:xfrm>
-          <a:prstGeom prst="line">
-            <a:avLst/>
-          </a:prstGeom>
-          <a:ln w="6350">
-            <a:solidFill>
-              <a:schemeClr val="tx1"/>
-            </a:solidFill>
-          </a:ln>
-        </p:spPr>
-        <p:style>
-          <a:lnRef idx="1">
-            <a:schemeClr val="accent1"/>
-          </a:lnRef>
-          <a:fillRef idx="0">
-            <a:schemeClr val="accent1"/>
-          </a:fillRef>
-          <a:effectRef idx="0">
-            <a:schemeClr val="accent1"/>
-          </a:effectRef>
-          <a:fontRef idx="minor">
-            <a:schemeClr val="tx1"/>
-          </a:fontRef>
-        </p:style>
-      </p:cxnSp>
-      <p:grpSp>
-        <p:nvGrpSpPr>
-          <p:cNvPr id="351" name="Group 350"/>
-          <p:cNvGrpSpPr/>
-          <p:nvPr/>
-        </p:nvGrpSpPr>
-        <p:grpSpPr>
-          <a:xfrm>
-            <a:off x="2209751" y="3595727"/>
-            <a:ext cx="336952" cy="230832"/>
-            <a:chOff x="2397460" y="2825291"/>
-            <a:chExt cx="350718" cy="238182"/>
-          </a:xfrm>
-        </p:grpSpPr>
-        <p:sp>
-          <p:nvSpPr>
-            <p:cNvPr id="352" name="Oval 351"/>
-            <p:cNvSpPr/>
-            <p:nvPr/>
-          </p:nvSpPr>
-          <p:spPr>
-            <a:xfrm>
-              <a:off x="2474589" y="2856296"/>
-              <a:ext cx="180000" cy="180000"/>
-            </a:xfrm>
-            <a:prstGeom prst="ellipse">
-              <a:avLst/>
-            </a:prstGeom>
-            <a:solidFill>
-              <a:schemeClr val="bg1"/>
-            </a:solidFill>
-            <a:ln w="3175">
-              <a:solidFill>
-                <a:schemeClr val="tx1"/>
-              </a:solidFill>
-            </a:ln>
-          </p:spPr>
-          <p:style>
-            <a:lnRef idx="2">
-              <a:schemeClr val="accent1">
-                <a:shade val="50000"/>
-              </a:schemeClr>
-            </a:lnRef>
-            <a:fillRef idx="1">
-              <a:schemeClr val="accent1"/>
-            </a:fillRef>
-            <a:effectRef idx="0">
-              <a:schemeClr val="accent1"/>
-            </a:effectRef>
-            <a:fontRef idx="minor">
-              <a:schemeClr val="lt1"/>
-            </a:fontRef>
-          </p:style>
-          <p:txBody>
-            <a:bodyPr rtlCol="0" anchor="ctr"/>
-            <a:lstStyle/>
-            <a:p>
-              <a:pPr algn="ctr"/>
-              <a:endParaRPr lang="es-AR"/>
-            </a:p>
-          </p:txBody>
-        </p:sp>
-        <mc:AlternateContent xmlns:mc="http://schemas.openxmlformats.org/markup-compatibility/2006">
-          <mc:Choice xmlns:a14="http://schemas.microsoft.com/office/drawing/2010/main" Requires="a14">
-            <p:sp>
-              <p:nvSpPr>
-                <p:cNvPr id="353" name="TextBox 352"/>
-                <p:cNvSpPr txBox="1"/>
-                <p:nvPr/>
-              </p:nvSpPr>
-              <p:spPr>
-                <a:xfrm>
-                  <a:off x="2397460" y="2825291"/>
-                  <a:ext cx="350718" cy="238182"/>
-                </a:xfrm>
-                <a:prstGeom prst="rect">
-                  <a:avLst/>
-                </a:prstGeom>
-                <a:noFill/>
-              </p:spPr>
-              <p:txBody>
-                <a:bodyPr wrap="none" rtlCol="0">
-                  <a:spAutoFit/>
-                </a:bodyPr>
-                <a:lstStyle/>
-                <a:p>
-                  <a14:m>
-                    <m:oMathPara xmlns:m="http://schemas.openxmlformats.org/officeDocument/2006/math">
-                      <m:oMathParaPr>
-                        <m:jc m:val="centerGroup"/>
-                      </m:oMathParaPr>
-                      <m:oMath xmlns:m="http://schemas.openxmlformats.org/officeDocument/2006/math">
-                        <m:sSub>
-                          <m:sSubPr>
-                            <m:ctrlPr>
-                              <a:rPr lang="es-AR" sz="900" i="1" smtClean="0">
-                                <a:latin typeface="Cambria Math"/>
-                                <a:ea typeface="Cambria Math"/>
-                              </a:rPr>
-                            </m:ctrlPr>
-                          </m:sSubPr>
-                          <m:e>
-                            <m:r>
-                              <a:rPr lang="es-AR" sz="900" b="0" i="1" smtClean="0">
-                                <a:latin typeface="Cambria Math"/>
-                                <a:ea typeface="Cambria Math"/>
-                              </a:rPr>
-                              <m:t>𝐴</m:t>
-                            </m:r>
-                          </m:e>
-                          <m:sub>
-                            <m:r>
-                              <a:rPr lang="es-AR" sz="900" b="0" i="1" smtClean="0">
-                                <a:latin typeface="Cambria Math"/>
-                                <a:ea typeface="Cambria Math"/>
-                              </a:rPr>
-                              <m:t>3</m:t>
-                            </m:r>
-                          </m:sub>
-                        </m:sSub>
-                      </m:oMath>
-                    </m:oMathPara>
-                  </a14:m>
-                  <a:endParaRPr lang="es-AR" sz="1400" dirty="0"/>
-                </a:p>
-              </p:txBody>
-            </p:sp>
-          </mc:Choice>
-          <mc:Fallback>
-            <p:sp>
-              <p:nvSpPr>
-                <p:cNvPr id="353" name="TextBox 352"/>
                 <p:cNvSpPr txBox="1">
                   <a:spLocks noRot="1" noChangeAspect="1" noMove="1" noResize="1" noEditPoints="1" noAdjustHandles="1" noChangeArrowheads="1" noChangeShapeType="1" noTextEdit="1"/>
                 </p:cNvSpPr>
@@ -7741,6 +7134,41 @@
           </mc:Fallback>
         </mc:AlternateContent>
       </p:grpSp>
+      <p:cxnSp>
+        <p:nvCxnSpPr>
+          <p:cNvPr id="348" name="Straight Connector 347"/>
+          <p:cNvCxnSpPr/>
+          <p:nvPr/>
+        </p:nvCxnSpPr>
+        <p:spPr>
+          <a:xfrm flipH="1">
+            <a:off x="1953887" y="3908752"/>
+            <a:ext cx="1" cy="63967"/>
+          </a:xfrm>
+          <a:prstGeom prst="line">
+            <a:avLst/>
+          </a:prstGeom>
+          <a:ln w="6350">
+            <a:solidFill>
+              <a:schemeClr val="tx1"/>
+            </a:solidFill>
+          </a:ln>
+        </p:spPr>
+        <p:style>
+          <a:lnRef idx="1">
+            <a:schemeClr val="accent1"/>
+          </a:lnRef>
+          <a:fillRef idx="0">
+            <a:schemeClr val="accent1"/>
+          </a:fillRef>
+          <a:effectRef idx="0">
+            <a:schemeClr val="accent1"/>
+          </a:effectRef>
+          <a:fontRef idx="minor">
+            <a:schemeClr val="tx1"/>
+          </a:fontRef>
+        </p:style>
+      </p:cxnSp>
       <p:cxnSp>
         <p:nvCxnSpPr>
           <p:cNvPr id="354" name="Straight Connector 353"/>
@@ -7838,8 +7266,8 @@
             </a:p>
           </p:txBody>
         </p:sp>
-        <mc:AlternateContent xmlns:mc="http://schemas.openxmlformats.org/markup-compatibility/2006">
-          <mc:Choice xmlns:a14="http://schemas.microsoft.com/office/drawing/2010/main" Requires="a14">
+        <mc:AlternateContent xmlns:mc="http://schemas.openxmlformats.org/markup-compatibility/2006" xmlns:a14="http://schemas.microsoft.com/office/drawing/2010/main">
+          <mc:Choice Requires="a14">
             <p:sp>
               <p:nvSpPr>
                 <p:cNvPr id="365" name="TextBox 364"/>
@@ -7862,6 +7290,7 @@
                 </a:bodyPr>
                 <a:lstStyle/>
                 <a:p>
+                  <a:pPr/>
                   <a14:m>
                     <m:oMathPara xmlns:m="http://schemas.openxmlformats.org/officeDocument/2006/math">
                       <m:oMathParaPr>
@@ -7883,7 +7312,7 @@
               </p:txBody>
             </p:sp>
           </mc:Choice>
-          <mc:Fallback>
+          <mc:Fallback xmlns="">
             <p:sp>
               <p:nvSpPr>
                 <p:cNvPr id="365" name="TextBox 364"/>
@@ -7958,6 +7387,1054 @@
           </a:fontRef>
         </p:style>
       </p:cxnSp>
+      <p:cxnSp>
+        <p:nvCxnSpPr>
+          <p:cNvPr id="5" name="Straight Arrow Connector 4"/>
+          <p:cNvCxnSpPr/>
+          <p:nvPr/>
+        </p:nvCxnSpPr>
+        <p:spPr>
+          <a:xfrm>
+            <a:off x="1678088" y="2838259"/>
+            <a:ext cx="144016" cy="0"/>
+          </a:xfrm>
+          <a:prstGeom prst="straightConnector1">
+            <a:avLst/>
+          </a:prstGeom>
+          <a:ln w="6350">
+            <a:solidFill>
+              <a:schemeClr val="tx1"/>
+            </a:solidFill>
+            <a:headEnd type="none" w="med" len="med"/>
+            <a:tailEnd type="triangle" w="med" len="med"/>
+          </a:ln>
+        </p:spPr>
+        <p:style>
+          <a:lnRef idx="1">
+            <a:schemeClr val="accent1"/>
+          </a:lnRef>
+          <a:fillRef idx="0">
+            <a:schemeClr val="accent1"/>
+          </a:fillRef>
+          <a:effectRef idx="0">
+            <a:schemeClr val="accent1"/>
+          </a:effectRef>
+          <a:fontRef idx="minor">
+            <a:schemeClr val="tx1"/>
+          </a:fontRef>
+        </p:style>
+      </p:cxnSp>
+      <p:cxnSp>
+        <p:nvCxnSpPr>
+          <p:cNvPr id="133" name="Straight Arrow Connector 132"/>
+          <p:cNvCxnSpPr/>
+          <p:nvPr/>
+        </p:nvCxnSpPr>
+        <p:spPr>
+          <a:xfrm rot="5400000">
+            <a:off x="1878883" y="3648467"/>
+            <a:ext cx="144016" cy="0"/>
+          </a:xfrm>
+          <a:prstGeom prst="straightConnector1">
+            <a:avLst/>
+          </a:prstGeom>
+          <a:ln w="6350">
+            <a:solidFill>
+              <a:schemeClr val="tx1"/>
+            </a:solidFill>
+            <a:headEnd type="none" w="med" len="med"/>
+            <a:tailEnd type="triangle" w="med" len="med"/>
+          </a:ln>
+        </p:spPr>
+        <p:style>
+          <a:lnRef idx="1">
+            <a:schemeClr val="accent1"/>
+          </a:lnRef>
+          <a:fillRef idx="0">
+            <a:schemeClr val="accent1"/>
+          </a:fillRef>
+          <a:effectRef idx="0">
+            <a:schemeClr val="accent1"/>
+          </a:effectRef>
+          <a:fontRef idx="minor">
+            <a:schemeClr val="tx1"/>
+          </a:fontRef>
+        </p:style>
+      </p:cxnSp>
+      <p:cxnSp>
+        <p:nvCxnSpPr>
+          <p:cNvPr id="142" name="Straight Connector 141"/>
+          <p:cNvCxnSpPr/>
+          <p:nvPr/>
+        </p:nvCxnSpPr>
+        <p:spPr>
+          <a:xfrm>
+            <a:off x="2367569" y="3065827"/>
+            <a:ext cx="0" cy="72904"/>
+          </a:xfrm>
+          <a:prstGeom prst="line">
+            <a:avLst/>
+          </a:prstGeom>
+          <a:ln w="6350">
+            <a:solidFill>
+              <a:schemeClr val="tx1"/>
+            </a:solidFill>
+          </a:ln>
+        </p:spPr>
+        <p:style>
+          <a:lnRef idx="1">
+            <a:schemeClr val="accent1"/>
+          </a:lnRef>
+          <a:fillRef idx="0">
+            <a:schemeClr val="accent1"/>
+          </a:fillRef>
+          <a:effectRef idx="0">
+            <a:schemeClr val="accent1"/>
+          </a:effectRef>
+          <a:fontRef idx="minor">
+            <a:schemeClr val="tx1"/>
+          </a:fontRef>
+        </p:style>
+      </p:cxnSp>
+      <p:cxnSp>
+        <p:nvCxnSpPr>
+          <p:cNvPr id="143" name="Straight Connector 142"/>
+          <p:cNvCxnSpPr/>
+          <p:nvPr/>
+        </p:nvCxnSpPr>
+        <p:spPr>
+          <a:xfrm>
+            <a:off x="2373719" y="3494409"/>
+            <a:ext cx="0" cy="242716"/>
+          </a:xfrm>
+          <a:prstGeom prst="line">
+            <a:avLst/>
+          </a:prstGeom>
+          <a:ln w="6350">
+            <a:solidFill>
+              <a:schemeClr val="tx1"/>
+            </a:solidFill>
+          </a:ln>
+        </p:spPr>
+        <p:style>
+          <a:lnRef idx="1">
+            <a:schemeClr val="accent1"/>
+          </a:lnRef>
+          <a:fillRef idx="0">
+            <a:schemeClr val="accent1"/>
+          </a:fillRef>
+          <a:effectRef idx="0">
+            <a:schemeClr val="accent1"/>
+          </a:effectRef>
+          <a:fontRef idx="minor">
+            <a:schemeClr val="tx1"/>
+          </a:fontRef>
+        </p:style>
+      </p:cxnSp>
+      <mc:AlternateContent xmlns:mc="http://schemas.openxmlformats.org/markup-compatibility/2006">
+        <mc:Choice xmlns:a14="http://schemas.microsoft.com/office/drawing/2010/main" Requires="a14">
+          <p:sp>
+            <p:nvSpPr>
+              <p:cNvPr id="144" name="TextBox 143"/>
+              <p:cNvSpPr txBox="1"/>
+              <p:nvPr/>
+            </p:nvSpPr>
+            <p:spPr>
+              <a:xfrm>
+                <a:off x="2373719" y="3153766"/>
+                <a:ext cx="310598" cy="261610"/>
+              </a:xfrm>
+              <a:prstGeom prst="rect">
+                <a:avLst/>
+              </a:prstGeom>
+              <a:noFill/>
+            </p:spPr>
+            <p:txBody>
+              <a:bodyPr wrap="none" rtlCol="0">
+                <a:spAutoFit/>
+              </a:bodyPr>
+              <a:lstStyle/>
+              <a:p>
+                <a:pPr/>
+                <a14:m>
+                  <m:oMathPara xmlns:m="http://schemas.openxmlformats.org/officeDocument/2006/math">
+                    <m:oMathParaPr>
+                      <m:jc m:val="centerGroup"/>
+                    </m:oMathParaPr>
+                    <m:oMath xmlns:m="http://schemas.openxmlformats.org/officeDocument/2006/math">
+                      <m:r>
+                        <a:rPr lang="es-AR" sz="1100" i="1" smtClean="0">
+                          <a:latin typeface="Cambria Math"/>
+                          <a:ea typeface="Cambria Math"/>
+                        </a:rPr>
+                        <m:t>𝑅</m:t>
+                      </m:r>
+                    </m:oMath>
+                  </m:oMathPara>
+                </a14:m>
+                <a:endParaRPr lang="es-AR" sz="1400" dirty="0"/>
+              </a:p>
+            </p:txBody>
+          </p:sp>
+        </mc:Choice>
+        <mc:Fallback>
+          <p:sp>
+            <p:nvSpPr>
+              <p:cNvPr id="144" name="TextBox 143"/>
+              <p:cNvSpPr txBox="1">
+                <a:spLocks noRot="1" noChangeAspect="1" noMove="1" noResize="1" noEditPoints="1" noAdjustHandles="1" noChangeArrowheads="1" noChangeShapeType="1" noTextEdit="1"/>
+              </p:cNvSpPr>
+              <p:nvPr/>
+            </p:nvSpPr>
+            <p:spPr>
+              <a:xfrm>
+                <a:off x="2373719" y="3153766"/>
+                <a:ext cx="310598" cy="261610"/>
+              </a:xfrm>
+              <a:prstGeom prst="rect">
+                <a:avLst/>
+              </a:prstGeom>
+              <a:blipFill rotWithShape="1">
+                <a:blip r:embed="rId7"/>
+                <a:stretch>
+                  <a:fillRect/>
+                </a:stretch>
+              </a:blipFill>
+            </p:spPr>
+            <p:txBody>
+              <a:bodyPr/>
+              <a:lstStyle/>
+              <a:p>
+                <a:r>
+                  <a:rPr lang="es-AR">
+                    <a:noFill/>
+                  </a:rPr>
+                  <a:t> </a:t>
+                </a:r>
+              </a:p>
+            </p:txBody>
+          </p:sp>
+        </mc:Fallback>
+      </mc:AlternateContent>
+      <p:cxnSp>
+        <p:nvCxnSpPr>
+          <p:cNvPr id="145" name="Straight Connector 144"/>
+          <p:cNvCxnSpPr/>
+          <p:nvPr/>
+        </p:nvCxnSpPr>
+        <p:spPr>
+          <a:xfrm flipH="1">
+            <a:off x="2376715" y="3908752"/>
+            <a:ext cx="1" cy="63967"/>
+          </a:xfrm>
+          <a:prstGeom prst="line">
+            <a:avLst/>
+          </a:prstGeom>
+          <a:ln w="6350">
+            <a:solidFill>
+              <a:schemeClr val="tx1"/>
+            </a:solidFill>
+          </a:ln>
+        </p:spPr>
+        <p:style>
+          <a:lnRef idx="1">
+            <a:schemeClr val="accent1"/>
+          </a:lnRef>
+          <a:fillRef idx="0">
+            <a:schemeClr val="accent1"/>
+          </a:fillRef>
+          <a:effectRef idx="0">
+            <a:schemeClr val="accent1"/>
+          </a:effectRef>
+          <a:fontRef idx="minor">
+            <a:schemeClr val="tx1"/>
+          </a:fontRef>
+        </p:style>
+      </p:cxnSp>
+      <p:cxnSp>
+        <p:nvCxnSpPr>
+          <p:cNvPr id="146" name="Straight Arrow Connector 145"/>
+          <p:cNvCxnSpPr/>
+          <p:nvPr/>
+        </p:nvCxnSpPr>
+        <p:spPr>
+          <a:xfrm rot="5400000">
+            <a:off x="2301711" y="3648467"/>
+            <a:ext cx="144016" cy="0"/>
+          </a:xfrm>
+          <a:prstGeom prst="straightConnector1">
+            <a:avLst/>
+          </a:prstGeom>
+          <a:ln w="6350">
+            <a:solidFill>
+              <a:schemeClr val="tx1"/>
+            </a:solidFill>
+            <a:headEnd type="none" w="med" len="med"/>
+            <a:tailEnd type="triangle" w="med" len="med"/>
+          </a:ln>
+        </p:spPr>
+        <p:style>
+          <a:lnRef idx="1">
+            <a:schemeClr val="accent1"/>
+          </a:lnRef>
+          <a:fillRef idx="0">
+            <a:schemeClr val="accent1"/>
+          </a:fillRef>
+          <a:effectRef idx="0">
+            <a:schemeClr val="accent1"/>
+          </a:effectRef>
+          <a:fontRef idx="minor">
+            <a:schemeClr val="tx1"/>
+          </a:fontRef>
+        </p:style>
+      </p:cxnSp>
+      <p:grpSp>
+        <p:nvGrpSpPr>
+          <p:cNvPr id="147" name="Group 146"/>
+          <p:cNvGrpSpPr/>
+          <p:nvPr/>
+        </p:nvGrpSpPr>
+        <p:grpSpPr>
+          <a:xfrm rot="5400000">
+            <a:off x="2197690" y="3245626"/>
+            <a:ext cx="358465" cy="163204"/>
+            <a:chOff x="2659249" y="1603127"/>
+            <a:chExt cx="864393" cy="736253"/>
+          </a:xfrm>
+        </p:grpSpPr>
+        <p:cxnSp>
+          <p:nvCxnSpPr>
+            <p:cNvPr id="148" name="Straight Connector 147"/>
+            <p:cNvCxnSpPr/>
+            <p:nvPr/>
+          </p:nvCxnSpPr>
+          <p:spPr>
+            <a:xfrm>
+              <a:off x="2659249" y="1979340"/>
+              <a:ext cx="72008" cy="360040"/>
+            </a:xfrm>
+            <a:prstGeom prst="line">
+              <a:avLst/>
+            </a:prstGeom>
+            <a:ln w="9525">
+              <a:solidFill>
+                <a:schemeClr val="tx1"/>
+              </a:solidFill>
+            </a:ln>
+          </p:spPr>
+          <p:style>
+            <a:lnRef idx="1">
+              <a:schemeClr val="accent1"/>
+            </a:lnRef>
+            <a:fillRef idx="0">
+              <a:schemeClr val="accent1"/>
+            </a:fillRef>
+            <a:effectRef idx="0">
+              <a:schemeClr val="accent1"/>
+            </a:effectRef>
+            <a:fontRef idx="minor">
+              <a:schemeClr val="tx1"/>
+            </a:fontRef>
+          </p:style>
+        </p:cxnSp>
+        <p:cxnSp>
+          <p:nvCxnSpPr>
+            <p:cNvPr id="149" name="Straight Connector 148"/>
+            <p:cNvCxnSpPr/>
+            <p:nvPr/>
+          </p:nvCxnSpPr>
+          <p:spPr>
+            <a:xfrm flipV="1">
+              <a:off x="2731554" y="1619300"/>
+              <a:ext cx="144016" cy="720080"/>
+            </a:xfrm>
+            <a:prstGeom prst="line">
+              <a:avLst/>
+            </a:prstGeom>
+            <a:ln w="9525">
+              <a:solidFill>
+                <a:schemeClr val="tx1"/>
+              </a:solidFill>
+            </a:ln>
+          </p:spPr>
+          <p:style>
+            <a:lnRef idx="1">
+              <a:schemeClr val="accent1"/>
+            </a:lnRef>
+            <a:fillRef idx="0">
+              <a:schemeClr val="accent1"/>
+            </a:fillRef>
+            <a:effectRef idx="0">
+              <a:schemeClr val="accent1"/>
+            </a:effectRef>
+            <a:fontRef idx="minor">
+              <a:schemeClr val="tx1"/>
+            </a:fontRef>
+          </p:style>
+        </p:cxnSp>
+        <p:cxnSp>
+          <p:nvCxnSpPr>
+            <p:cNvPr id="150" name="Straight Connector 149"/>
+            <p:cNvCxnSpPr/>
+            <p:nvPr/>
+          </p:nvCxnSpPr>
+          <p:spPr>
+            <a:xfrm flipV="1">
+              <a:off x="3019586" y="1619300"/>
+              <a:ext cx="144016" cy="720080"/>
+            </a:xfrm>
+            <a:prstGeom prst="line">
+              <a:avLst/>
+            </a:prstGeom>
+            <a:ln w="9525">
+              <a:solidFill>
+                <a:schemeClr val="tx1"/>
+              </a:solidFill>
+            </a:ln>
+          </p:spPr>
+          <p:style>
+            <a:lnRef idx="1">
+              <a:schemeClr val="accent1"/>
+            </a:lnRef>
+            <a:fillRef idx="0">
+              <a:schemeClr val="accent1"/>
+            </a:fillRef>
+            <a:effectRef idx="0">
+              <a:schemeClr val="accent1"/>
+            </a:effectRef>
+            <a:fontRef idx="minor">
+              <a:schemeClr val="tx1"/>
+            </a:fontRef>
+          </p:style>
+        </p:cxnSp>
+        <p:cxnSp>
+          <p:nvCxnSpPr>
+            <p:cNvPr id="151" name="Straight Connector 150"/>
+            <p:cNvCxnSpPr/>
+            <p:nvPr/>
+          </p:nvCxnSpPr>
+          <p:spPr>
+            <a:xfrm>
+              <a:off x="2875570" y="1619300"/>
+              <a:ext cx="144016" cy="720080"/>
+            </a:xfrm>
+            <a:prstGeom prst="line">
+              <a:avLst/>
+            </a:prstGeom>
+            <a:ln w="9525">
+              <a:solidFill>
+                <a:schemeClr val="tx1"/>
+              </a:solidFill>
+            </a:ln>
+          </p:spPr>
+          <p:style>
+            <a:lnRef idx="1">
+              <a:schemeClr val="accent1"/>
+            </a:lnRef>
+            <a:fillRef idx="0">
+              <a:schemeClr val="accent1"/>
+            </a:fillRef>
+            <a:effectRef idx="0">
+              <a:schemeClr val="accent1"/>
+            </a:effectRef>
+            <a:fontRef idx="minor">
+              <a:schemeClr val="tx1"/>
+            </a:fontRef>
+          </p:style>
+        </p:cxnSp>
+        <p:cxnSp>
+          <p:nvCxnSpPr>
+            <p:cNvPr id="152" name="Straight Connector 151"/>
+            <p:cNvCxnSpPr/>
+            <p:nvPr/>
+          </p:nvCxnSpPr>
+          <p:spPr>
+            <a:xfrm flipV="1">
+              <a:off x="3307618" y="1619300"/>
+              <a:ext cx="144016" cy="720080"/>
+            </a:xfrm>
+            <a:prstGeom prst="line">
+              <a:avLst/>
+            </a:prstGeom>
+            <a:ln w="9525">
+              <a:solidFill>
+                <a:schemeClr val="tx1"/>
+              </a:solidFill>
+            </a:ln>
+          </p:spPr>
+          <p:style>
+            <a:lnRef idx="1">
+              <a:schemeClr val="accent1"/>
+            </a:lnRef>
+            <a:fillRef idx="0">
+              <a:schemeClr val="accent1"/>
+            </a:fillRef>
+            <a:effectRef idx="0">
+              <a:schemeClr val="accent1"/>
+            </a:effectRef>
+            <a:fontRef idx="minor">
+              <a:schemeClr val="tx1"/>
+            </a:fontRef>
+          </p:style>
+        </p:cxnSp>
+        <p:cxnSp>
+          <p:nvCxnSpPr>
+            <p:cNvPr id="153" name="Straight Connector 152"/>
+            <p:cNvCxnSpPr/>
+            <p:nvPr/>
+          </p:nvCxnSpPr>
+          <p:spPr>
+            <a:xfrm>
+              <a:off x="3163602" y="1619300"/>
+              <a:ext cx="144016" cy="720080"/>
+            </a:xfrm>
+            <a:prstGeom prst="line">
+              <a:avLst/>
+            </a:prstGeom>
+            <a:ln w="9525">
+              <a:solidFill>
+                <a:schemeClr val="tx1"/>
+              </a:solidFill>
+            </a:ln>
+          </p:spPr>
+          <p:style>
+            <a:lnRef idx="1">
+              <a:schemeClr val="accent1"/>
+            </a:lnRef>
+            <a:fillRef idx="0">
+              <a:schemeClr val="accent1"/>
+            </a:fillRef>
+            <a:effectRef idx="0">
+              <a:schemeClr val="accent1"/>
+            </a:effectRef>
+            <a:fontRef idx="minor">
+              <a:schemeClr val="tx1"/>
+            </a:fontRef>
+          </p:style>
+        </p:cxnSp>
+        <p:cxnSp>
+          <p:nvCxnSpPr>
+            <p:cNvPr id="154" name="Straight Connector 153"/>
+            <p:cNvCxnSpPr/>
+            <p:nvPr/>
+          </p:nvCxnSpPr>
+          <p:spPr>
+            <a:xfrm>
+              <a:off x="3451634" y="1603127"/>
+              <a:ext cx="72008" cy="360040"/>
+            </a:xfrm>
+            <a:prstGeom prst="line">
+              <a:avLst/>
+            </a:prstGeom>
+            <a:ln w="9525">
+              <a:solidFill>
+                <a:schemeClr val="tx1"/>
+              </a:solidFill>
+            </a:ln>
+          </p:spPr>
+          <p:style>
+            <a:lnRef idx="1">
+              <a:schemeClr val="accent1"/>
+            </a:lnRef>
+            <a:fillRef idx="0">
+              <a:schemeClr val="accent1"/>
+            </a:fillRef>
+            <a:effectRef idx="0">
+              <a:schemeClr val="accent1"/>
+            </a:effectRef>
+            <a:fontRef idx="minor">
+              <a:schemeClr val="tx1"/>
+            </a:fontRef>
+          </p:style>
+        </p:cxnSp>
+      </p:grpSp>
+      <p:grpSp>
+        <p:nvGrpSpPr>
+          <p:cNvPr id="155" name="Group 154"/>
+          <p:cNvGrpSpPr/>
+          <p:nvPr/>
+        </p:nvGrpSpPr>
+        <p:grpSpPr>
+          <a:xfrm>
+            <a:off x="2219993" y="3710834"/>
+            <a:ext cx="336952" cy="230832"/>
+            <a:chOff x="2397460" y="2825291"/>
+            <a:chExt cx="350718" cy="238182"/>
+          </a:xfrm>
+        </p:grpSpPr>
+        <p:sp>
+          <p:nvSpPr>
+            <p:cNvPr id="156" name="Oval 155"/>
+            <p:cNvSpPr/>
+            <p:nvPr/>
+          </p:nvSpPr>
+          <p:spPr>
+            <a:xfrm>
+              <a:off x="2474589" y="2856296"/>
+              <a:ext cx="180000" cy="180000"/>
+            </a:xfrm>
+            <a:prstGeom prst="ellipse">
+              <a:avLst/>
+            </a:prstGeom>
+            <a:solidFill>
+              <a:schemeClr val="bg1"/>
+            </a:solidFill>
+            <a:ln w="3175">
+              <a:solidFill>
+                <a:schemeClr val="tx1"/>
+              </a:solidFill>
+            </a:ln>
+          </p:spPr>
+          <p:style>
+            <a:lnRef idx="2">
+              <a:schemeClr val="accent1">
+                <a:shade val="50000"/>
+              </a:schemeClr>
+            </a:lnRef>
+            <a:fillRef idx="1">
+              <a:schemeClr val="accent1"/>
+            </a:fillRef>
+            <a:effectRef idx="0">
+              <a:schemeClr val="accent1"/>
+            </a:effectRef>
+            <a:fontRef idx="minor">
+              <a:schemeClr val="lt1"/>
+            </a:fontRef>
+          </p:style>
+          <p:txBody>
+            <a:bodyPr rtlCol="0" anchor="ctr"/>
+            <a:lstStyle/>
+            <a:p>
+              <a:pPr algn="ctr"/>
+              <a:endParaRPr lang="es-AR"/>
+            </a:p>
+          </p:txBody>
+        </p:sp>
+        <mc:AlternateContent xmlns:mc="http://schemas.openxmlformats.org/markup-compatibility/2006" xmlns:a14="http://schemas.microsoft.com/office/drawing/2010/main">
+          <mc:Choice Requires="a14">
+            <p:sp>
+              <p:nvSpPr>
+                <p:cNvPr id="157" name="TextBox 156"/>
+                <p:cNvSpPr txBox="1"/>
+                <p:nvPr/>
+              </p:nvSpPr>
+              <p:spPr>
+                <a:xfrm>
+                  <a:off x="2397460" y="2825291"/>
+                  <a:ext cx="350718" cy="238182"/>
+                </a:xfrm>
+                <a:prstGeom prst="rect">
+                  <a:avLst/>
+                </a:prstGeom>
+                <a:noFill/>
+              </p:spPr>
+              <p:txBody>
+                <a:bodyPr wrap="none" rtlCol="0">
+                  <a:spAutoFit/>
+                </a:bodyPr>
+                <a:lstStyle/>
+                <a:p>
+                  <a:pPr/>
+                  <a14:m>
+                    <m:oMathPara xmlns:m="http://schemas.openxmlformats.org/officeDocument/2006/math">
+                      <m:oMathParaPr>
+                        <m:jc m:val="centerGroup"/>
+                      </m:oMathParaPr>
+                      <m:oMath xmlns:m="http://schemas.openxmlformats.org/officeDocument/2006/math">
+                        <m:sSub>
+                          <m:sSubPr>
+                            <m:ctrlPr>
+                              <a:rPr lang="es-AR" sz="900" i="1" smtClean="0">
+                                <a:latin typeface="Cambria Math"/>
+                                <a:ea typeface="Cambria Math"/>
+                              </a:rPr>
+                            </m:ctrlPr>
+                          </m:sSubPr>
+                          <m:e>
+                            <m:r>
+                              <a:rPr lang="es-AR" sz="900" b="0" i="1" smtClean="0">
+                                <a:latin typeface="Cambria Math"/>
+                                <a:ea typeface="Cambria Math"/>
+                              </a:rPr>
+                              <m:t>𝐴</m:t>
+                            </m:r>
+                          </m:e>
+                          <m:sub>
+                            <m:r>
+                              <a:rPr lang="es-AR" sz="900" b="0" i="1" smtClean="0">
+                                <a:latin typeface="Cambria Math"/>
+                                <a:ea typeface="Cambria Math"/>
+                              </a:rPr>
+                              <m:t>2</m:t>
+                            </m:r>
+                          </m:sub>
+                        </m:sSub>
+                      </m:oMath>
+                    </m:oMathPara>
+                  </a14:m>
+                  <a:endParaRPr lang="es-AR" sz="1400" dirty="0"/>
+                </a:p>
+              </p:txBody>
+            </p:sp>
+          </mc:Choice>
+          <mc:Fallback xmlns="">
+            <p:sp>
+              <p:nvSpPr>
+                <p:cNvPr id="339" name="TextBox 338"/>
+                <p:cNvSpPr txBox="1">
+                  <a:spLocks noRot="1" noChangeAspect="1" noMove="1" noResize="1" noEditPoints="1" noAdjustHandles="1" noChangeArrowheads="1" noChangeShapeType="1" noTextEdit="1"/>
+                </p:cNvSpPr>
+                <p:nvPr/>
+              </p:nvSpPr>
+              <p:spPr>
+                <a:xfrm>
+                  <a:off x="2397460" y="2825291"/>
+                  <a:ext cx="350718" cy="238182"/>
+                </a:xfrm>
+                <a:prstGeom prst="rect">
+                  <a:avLst/>
+                </a:prstGeom>
+                <a:blipFill rotWithShape="1">
+                  <a:blip r:embed="rId10"/>
+                  <a:stretch>
+                    <a:fillRect/>
+                  </a:stretch>
+                </a:blipFill>
+              </p:spPr>
+              <p:txBody>
+                <a:bodyPr/>
+                <a:lstStyle/>
+                <a:p>
+                  <a:r>
+                    <a:rPr lang="es-AR">
+                      <a:noFill/>
+                    </a:rPr>
+                    <a:t> </a:t>
+                  </a:r>
+                </a:p>
+              </p:txBody>
+            </p:sp>
+          </mc:Fallback>
+        </mc:AlternateContent>
+      </p:grpSp>
+      <mc:AlternateContent xmlns:mc="http://schemas.openxmlformats.org/markup-compatibility/2006">
+        <mc:Choice xmlns:a14="http://schemas.microsoft.com/office/drawing/2010/main" Requires="a14">
+          <p:sp>
+            <p:nvSpPr>
+              <p:cNvPr id="160" name="TextBox 159"/>
+              <p:cNvSpPr txBox="1"/>
+              <p:nvPr/>
+            </p:nvSpPr>
+            <p:spPr>
+              <a:xfrm>
+                <a:off x="1601401" y="2819961"/>
+                <a:ext cx="297389" cy="230832"/>
+              </a:xfrm>
+              <a:prstGeom prst="rect">
+                <a:avLst/>
+              </a:prstGeom>
+              <a:noFill/>
+            </p:spPr>
+            <p:txBody>
+              <a:bodyPr wrap="none" rtlCol="0">
+                <a:spAutoFit/>
+              </a:bodyPr>
+              <a:lstStyle/>
+              <a:p>
+                <a:pPr/>
+                <a14:m>
+                  <m:oMathPara xmlns:m="http://schemas.openxmlformats.org/officeDocument/2006/math">
+                    <m:oMathParaPr>
+                      <m:jc m:val="centerGroup"/>
+                    </m:oMathParaPr>
+                    <m:oMath xmlns:m="http://schemas.openxmlformats.org/officeDocument/2006/math">
+                      <m:sSub>
+                        <m:sSubPr>
+                          <m:ctrlPr>
+                            <a:rPr lang="es-AR" sz="900" i="1" smtClean="0">
+                              <a:latin typeface="Cambria Math"/>
+                              <a:ea typeface="Cambria Math"/>
+                            </a:rPr>
+                          </m:ctrlPr>
+                        </m:sSubPr>
+                        <m:e>
+                          <m:r>
+                            <a:rPr lang="es-AR" sz="900" b="0" i="1" smtClean="0">
+                              <a:latin typeface="Cambria Math"/>
+                              <a:ea typeface="Cambria Math"/>
+                            </a:rPr>
+                            <m:t>𝑖</m:t>
+                          </m:r>
+                        </m:e>
+                        <m:sub>
+                          <m:r>
+                            <a:rPr lang="es-AR" sz="900" b="0" i="1" smtClean="0">
+                              <a:latin typeface="Cambria Math"/>
+                              <a:ea typeface="Cambria Math"/>
+                            </a:rPr>
+                            <m:t>1</m:t>
+                          </m:r>
+                        </m:sub>
+                      </m:sSub>
+                    </m:oMath>
+                  </m:oMathPara>
+                </a14:m>
+                <a:endParaRPr lang="es-AR" sz="1400" dirty="0"/>
+              </a:p>
+            </p:txBody>
+          </p:sp>
+        </mc:Choice>
+        <mc:Fallback>
+          <p:sp>
+            <p:nvSpPr>
+              <p:cNvPr id="160" name="TextBox 159"/>
+              <p:cNvSpPr txBox="1">
+                <a:spLocks noRot="1" noChangeAspect="1" noMove="1" noResize="1" noEditPoints="1" noAdjustHandles="1" noChangeArrowheads="1" noChangeShapeType="1" noTextEdit="1"/>
+              </p:cNvSpPr>
+              <p:nvPr/>
+            </p:nvSpPr>
+            <p:spPr>
+              <a:xfrm>
+                <a:off x="1601401" y="2819961"/>
+                <a:ext cx="297389" cy="230832"/>
+              </a:xfrm>
+              <a:prstGeom prst="rect">
+                <a:avLst/>
+              </a:prstGeom>
+              <a:blipFill rotWithShape="1">
+                <a:blip r:embed="rId12"/>
+                <a:stretch>
+                  <a:fillRect/>
+                </a:stretch>
+              </a:blipFill>
+            </p:spPr>
+            <p:txBody>
+              <a:bodyPr/>
+              <a:lstStyle/>
+              <a:p>
+                <a:r>
+                  <a:rPr lang="es-AR">
+                    <a:noFill/>
+                  </a:rPr>
+                  <a:t> </a:t>
+                </a:r>
+              </a:p>
+            </p:txBody>
+          </p:sp>
+        </mc:Fallback>
+      </mc:AlternateContent>
+      <mc:AlternateContent xmlns:mc="http://schemas.openxmlformats.org/markup-compatibility/2006">
+        <mc:Choice xmlns:a14="http://schemas.microsoft.com/office/drawing/2010/main" Requires="a14">
+          <p:sp>
+            <p:nvSpPr>
+              <p:cNvPr id="161" name="TextBox 160"/>
+              <p:cNvSpPr txBox="1"/>
+              <p:nvPr/>
+            </p:nvSpPr>
+            <p:spPr>
+              <a:xfrm>
+                <a:off x="1700538" y="3456554"/>
+                <a:ext cx="300082" cy="230832"/>
+              </a:xfrm>
+              <a:prstGeom prst="rect">
+                <a:avLst/>
+              </a:prstGeom>
+              <a:noFill/>
+            </p:spPr>
+            <p:txBody>
+              <a:bodyPr wrap="none" rtlCol="0">
+                <a:spAutoFit/>
+              </a:bodyPr>
+              <a:lstStyle/>
+              <a:p>
+                <a:pPr/>
+                <a14:m>
+                  <m:oMathPara xmlns:m="http://schemas.openxmlformats.org/officeDocument/2006/math">
+                    <m:oMathParaPr>
+                      <m:jc m:val="centerGroup"/>
+                    </m:oMathParaPr>
+                    <m:oMath xmlns:m="http://schemas.openxmlformats.org/officeDocument/2006/math">
+                      <m:sSub>
+                        <m:sSubPr>
+                          <m:ctrlPr>
+                            <a:rPr lang="es-AR" sz="900" i="1" smtClean="0">
+                              <a:latin typeface="Cambria Math"/>
+                              <a:ea typeface="Cambria Math"/>
+                            </a:rPr>
+                          </m:ctrlPr>
+                        </m:sSubPr>
+                        <m:e>
+                          <m:r>
+                            <a:rPr lang="es-AR" sz="900" b="0" i="1" smtClean="0">
+                              <a:latin typeface="Cambria Math"/>
+                              <a:ea typeface="Cambria Math"/>
+                            </a:rPr>
+                            <m:t>𝑖</m:t>
+                          </m:r>
+                        </m:e>
+                        <m:sub>
+                          <m:r>
+                            <a:rPr lang="es-AR" sz="900" b="0" i="1" smtClean="0">
+                              <a:latin typeface="Cambria Math"/>
+                              <a:ea typeface="Cambria Math"/>
+                            </a:rPr>
+                            <m:t>2</m:t>
+                          </m:r>
+                        </m:sub>
+                      </m:sSub>
+                    </m:oMath>
+                  </m:oMathPara>
+                </a14:m>
+                <a:endParaRPr lang="es-AR" sz="1400" dirty="0"/>
+              </a:p>
+            </p:txBody>
+          </p:sp>
+        </mc:Choice>
+        <mc:Fallback>
+          <p:sp>
+            <p:nvSpPr>
+              <p:cNvPr id="161" name="TextBox 160"/>
+              <p:cNvSpPr txBox="1">
+                <a:spLocks noRot="1" noChangeAspect="1" noMove="1" noResize="1" noEditPoints="1" noAdjustHandles="1" noChangeArrowheads="1" noChangeShapeType="1" noTextEdit="1"/>
+              </p:cNvSpPr>
+              <p:nvPr/>
+            </p:nvSpPr>
+            <p:spPr>
+              <a:xfrm>
+                <a:off x="1700538" y="3456554"/>
+                <a:ext cx="300082" cy="230832"/>
+              </a:xfrm>
+              <a:prstGeom prst="rect">
+                <a:avLst/>
+              </a:prstGeom>
+              <a:blipFill rotWithShape="1">
+                <a:blip r:embed="rId13"/>
+                <a:stretch>
+                  <a:fillRect/>
+                </a:stretch>
+              </a:blipFill>
+            </p:spPr>
+            <p:txBody>
+              <a:bodyPr/>
+              <a:lstStyle/>
+              <a:p>
+                <a:r>
+                  <a:rPr lang="es-AR">
+                    <a:noFill/>
+                  </a:rPr>
+                  <a:t> </a:t>
+                </a:r>
+              </a:p>
+            </p:txBody>
+          </p:sp>
+        </mc:Fallback>
+      </mc:AlternateContent>
+      <mc:AlternateContent xmlns:mc="http://schemas.openxmlformats.org/markup-compatibility/2006">
+        <mc:Choice xmlns:a14="http://schemas.microsoft.com/office/drawing/2010/main" Requires="a14">
+          <p:sp>
+            <p:nvSpPr>
+              <p:cNvPr id="162" name="TextBox 161"/>
+              <p:cNvSpPr txBox="1"/>
+              <p:nvPr/>
+            </p:nvSpPr>
+            <p:spPr>
+              <a:xfrm>
+                <a:off x="2316989" y="3447124"/>
+                <a:ext cx="300082" cy="230832"/>
+              </a:xfrm>
+              <a:prstGeom prst="rect">
+                <a:avLst/>
+              </a:prstGeom>
+              <a:noFill/>
+            </p:spPr>
+            <p:txBody>
+              <a:bodyPr wrap="none" rtlCol="0">
+                <a:spAutoFit/>
+              </a:bodyPr>
+              <a:lstStyle/>
+              <a:p>
+                <a:pPr/>
+                <a14:m>
+                  <m:oMathPara xmlns:m="http://schemas.openxmlformats.org/officeDocument/2006/math">
+                    <m:oMathParaPr>
+                      <m:jc m:val="centerGroup"/>
+                    </m:oMathParaPr>
+                    <m:oMath xmlns:m="http://schemas.openxmlformats.org/officeDocument/2006/math">
+                      <m:sSub>
+                        <m:sSubPr>
+                          <m:ctrlPr>
+                            <a:rPr lang="es-AR" sz="900" i="1" smtClean="0">
+                              <a:latin typeface="Cambria Math"/>
+                              <a:ea typeface="Cambria Math"/>
+                            </a:rPr>
+                          </m:ctrlPr>
+                        </m:sSubPr>
+                        <m:e>
+                          <m:r>
+                            <a:rPr lang="es-AR" sz="900" b="0" i="1" smtClean="0">
+                              <a:latin typeface="Cambria Math"/>
+                              <a:ea typeface="Cambria Math"/>
+                            </a:rPr>
+                            <m:t>𝑖</m:t>
+                          </m:r>
+                        </m:e>
+                        <m:sub>
+                          <m:r>
+                            <a:rPr lang="es-AR" sz="900" b="0" i="1" smtClean="0">
+                              <a:latin typeface="Cambria Math"/>
+                              <a:ea typeface="Cambria Math"/>
+                            </a:rPr>
+                            <m:t>3</m:t>
+                          </m:r>
+                        </m:sub>
+                      </m:sSub>
+                    </m:oMath>
+                  </m:oMathPara>
+                </a14:m>
+                <a:endParaRPr lang="es-AR" sz="1400" dirty="0"/>
+              </a:p>
+            </p:txBody>
+          </p:sp>
+        </mc:Choice>
+        <mc:Fallback>
+          <p:sp>
+            <p:nvSpPr>
+              <p:cNvPr id="162" name="TextBox 161"/>
+              <p:cNvSpPr txBox="1">
+                <a:spLocks noRot="1" noChangeAspect="1" noMove="1" noResize="1" noEditPoints="1" noAdjustHandles="1" noChangeArrowheads="1" noChangeShapeType="1" noTextEdit="1"/>
+              </p:cNvSpPr>
+              <p:nvPr/>
+            </p:nvSpPr>
+            <p:spPr>
+              <a:xfrm>
+                <a:off x="2316989" y="3447124"/>
+                <a:ext cx="300082" cy="230832"/>
+              </a:xfrm>
+              <a:prstGeom prst="rect">
+                <a:avLst/>
+              </a:prstGeom>
+              <a:blipFill rotWithShape="1">
+                <a:blip r:embed="rId14"/>
+                <a:stretch>
+                  <a:fillRect/>
+                </a:stretch>
+              </a:blipFill>
+            </p:spPr>
+            <p:txBody>
+              <a:bodyPr/>
+              <a:lstStyle/>
+              <a:p>
+                <a:r>
+                  <a:rPr lang="es-AR">
+                    <a:noFill/>
+                  </a:rPr>
+                  <a:t> </a:t>
+                </a:r>
+              </a:p>
+            </p:txBody>
+          </p:sp>
+        </mc:Fallback>
+      </mc:AlternateContent>
     </p:spTree>
     <p:extLst>
       <p:ext uri="{BB962C8B-B14F-4D97-AF65-F5344CB8AC3E}">

</xml_diff>